<commit_message>
Replace herding_the_elephants_advnet.pptx with the newest version.
</commit_message>
<xml_diff>
--- a/presentation/herding_the_elephants_advnet.pptx
+++ b/presentation/herding_the_elephants_advnet.pptx
@@ -14,9 +14,10 @@
     <p:sldId id="264" r:id="rId8"/>
     <p:sldId id="263" r:id="rId9"/>
     <p:sldId id="267" r:id="rId10"/>
-    <p:sldId id="265" r:id="rId11"/>
-    <p:sldId id="262" r:id="rId12"/>
-    <p:sldId id="266" r:id="rId13"/>
+    <p:sldId id="268" r:id="rId11"/>
+    <p:sldId id="265" r:id="rId12"/>
+    <p:sldId id="262" r:id="rId13"/>
+    <p:sldId id="266" r:id="rId14"/>
   </p:sldIdLst>
   <p:sldSz cx="12192000" cy="6858000"/>
   <p:notesSz cx="6858000" cy="9144000"/>
@@ -272,7 +273,7 @@
           <a:p>
             <a:fld id="{72F73065-132F-457B-83A6-2EDBC465E42B}" type="datetimeFigureOut">
               <a:rPr lang="en-CH" smtClean="0"/>
-              <a:t>9 Dec 2019</a:t>
+              <a:t>10 Dec 2019</a:t>
             </a:fld>
             <a:endParaRPr lang="en-CH"/>
           </a:p>
@@ -472,7 +473,7 @@
           <a:p>
             <a:fld id="{72F73065-132F-457B-83A6-2EDBC465E42B}" type="datetimeFigureOut">
               <a:rPr lang="en-CH" smtClean="0"/>
-              <a:t>9 Dec 2019</a:t>
+              <a:t>10 Dec 2019</a:t>
             </a:fld>
             <a:endParaRPr lang="en-CH"/>
           </a:p>
@@ -682,7 +683,7 @@
           <a:p>
             <a:fld id="{72F73065-132F-457B-83A6-2EDBC465E42B}" type="datetimeFigureOut">
               <a:rPr lang="en-CH" smtClean="0"/>
-              <a:t>9 Dec 2019</a:t>
+              <a:t>10 Dec 2019</a:t>
             </a:fld>
             <a:endParaRPr lang="en-CH"/>
           </a:p>
@@ -882,7 +883,7 @@
           <a:p>
             <a:fld id="{72F73065-132F-457B-83A6-2EDBC465E42B}" type="datetimeFigureOut">
               <a:rPr lang="en-CH" smtClean="0"/>
-              <a:t>9 Dec 2019</a:t>
+              <a:t>10 Dec 2019</a:t>
             </a:fld>
             <a:endParaRPr lang="en-CH"/>
           </a:p>
@@ -1158,7 +1159,7 @@
           <a:p>
             <a:fld id="{72F73065-132F-457B-83A6-2EDBC465E42B}" type="datetimeFigureOut">
               <a:rPr lang="en-CH" smtClean="0"/>
-              <a:t>9 Dec 2019</a:t>
+              <a:t>10 Dec 2019</a:t>
             </a:fld>
             <a:endParaRPr lang="en-CH"/>
           </a:p>
@@ -1426,7 +1427,7 @@
           <a:p>
             <a:fld id="{72F73065-132F-457B-83A6-2EDBC465E42B}" type="datetimeFigureOut">
               <a:rPr lang="en-CH" smtClean="0"/>
-              <a:t>9 Dec 2019</a:t>
+              <a:t>10 Dec 2019</a:t>
             </a:fld>
             <a:endParaRPr lang="en-CH"/>
           </a:p>
@@ -1841,7 +1842,7 @@
           <a:p>
             <a:fld id="{72F73065-132F-457B-83A6-2EDBC465E42B}" type="datetimeFigureOut">
               <a:rPr lang="en-CH" smtClean="0"/>
-              <a:t>9 Dec 2019</a:t>
+              <a:t>10 Dec 2019</a:t>
             </a:fld>
             <a:endParaRPr lang="en-CH"/>
           </a:p>
@@ -1983,7 +1984,7 @@
           <a:p>
             <a:fld id="{72F73065-132F-457B-83A6-2EDBC465E42B}" type="datetimeFigureOut">
               <a:rPr lang="en-CH" smtClean="0"/>
-              <a:t>9 Dec 2019</a:t>
+              <a:t>10 Dec 2019</a:t>
             </a:fld>
             <a:endParaRPr lang="en-CH"/>
           </a:p>
@@ -2096,7 +2097,7 @@
           <a:p>
             <a:fld id="{72F73065-132F-457B-83A6-2EDBC465E42B}" type="datetimeFigureOut">
               <a:rPr lang="en-CH" smtClean="0"/>
-              <a:t>9 Dec 2019</a:t>
+              <a:t>10 Dec 2019</a:t>
             </a:fld>
             <a:endParaRPr lang="en-CH"/>
           </a:p>
@@ -2409,7 +2410,7 @@
           <a:p>
             <a:fld id="{72F73065-132F-457B-83A6-2EDBC465E42B}" type="datetimeFigureOut">
               <a:rPr lang="en-CH" smtClean="0"/>
-              <a:t>9 Dec 2019</a:t>
+              <a:t>10 Dec 2019</a:t>
             </a:fld>
             <a:endParaRPr lang="en-CH"/>
           </a:p>
@@ -2698,7 +2699,7 @@
           <a:p>
             <a:fld id="{72F73065-132F-457B-83A6-2EDBC465E42B}" type="datetimeFigureOut">
               <a:rPr lang="en-CH" smtClean="0"/>
-              <a:t>9 Dec 2019</a:t>
+              <a:t>10 Dec 2019</a:t>
             </a:fld>
             <a:endParaRPr lang="en-CH"/>
           </a:p>
@@ -2941,7 +2942,7 @@
           <a:p>
             <a:fld id="{72F73065-132F-457B-83A6-2EDBC465E42B}" type="datetimeFigureOut">
               <a:rPr lang="en-CH" smtClean="0"/>
-              <a:t>9 Dec 2019</a:t>
+              <a:t>10 Dec 2019</a:t>
             </a:fld>
             <a:endParaRPr lang="en-CH"/>
           </a:p>
@@ -3462,7 +3463,7 @@
           <p:cNvPr id="2" name="Title 1">
             <a:extLst>
               <a:ext uri="{FF2B5EF4-FFF2-40B4-BE49-F238E27FC236}">
-                <a16:creationId xmlns:a16="http://schemas.microsoft.com/office/drawing/2014/main" id="{A21E7202-3D7D-407C-8EE0-91BF00CB80A1}"/>
+                <a16:creationId xmlns:a16="http://schemas.microsoft.com/office/drawing/2014/main" id="{3F2827E4-2CF4-4325-B5E4-7CB748734F24}"/>
               </a:ext>
             </a:extLst>
           </p:cNvPr>
@@ -3480,78 +3481,51 @@
           <a:p>
             <a:r>
               <a:rPr lang="de-CH" dirty="0"/>
-              <a:t>Evaluation</a:t>
+              <a:t>Test topology</a:t>
             </a:r>
             <a:endParaRPr lang="en-CH" dirty="0"/>
           </a:p>
         </p:txBody>
       </p:sp>
-      <p:sp>
-        <p:nvSpPr>
-          <p:cNvPr id="3" name="Content Placeholder 2">
-            <a:extLst>
-              <a:ext uri="{FF2B5EF4-FFF2-40B4-BE49-F238E27FC236}">
-                <a16:creationId xmlns:a16="http://schemas.microsoft.com/office/drawing/2014/main" id="{272C2361-FD38-4046-8377-3FE1D473EB1F}"/>
-              </a:ext>
-            </a:extLst>
-          </p:cNvPr>
-          <p:cNvSpPr>
-            <a:spLocks noGrp="1"/>
-          </p:cNvSpPr>
+      <p:pic>
+        <p:nvPicPr>
+          <p:cNvPr id="5" name="Content Placeholder 4">
+            <a:extLst>
+              <a:ext uri="{FF2B5EF4-FFF2-40B4-BE49-F238E27FC236}">
+                <a16:creationId xmlns:a16="http://schemas.microsoft.com/office/drawing/2014/main" id="{745BE9F6-F398-4AA2-A065-36D2D2498F0D}"/>
+              </a:ext>
+            </a:extLst>
+          </p:cNvPr>
+          <p:cNvPicPr>
+            <a:picLocks noGrp="1" noChangeAspect="1"/>
+          </p:cNvPicPr>
           <p:nvPr>
             <p:ph idx="1"/>
           </p:nvPr>
-        </p:nvSpPr>
-        <p:spPr>
-          <a:xfrm>
-            <a:off x="9803876" y="5844619"/>
-            <a:ext cx="1549924" cy="332344"/>
-          </a:xfrm>
-        </p:spPr>
-        <p:txBody>
-          <a:bodyPr>
-            <a:normAutofit fontScale="70000" lnSpcReduction="20000"/>
-          </a:bodyPr>
-          <a:lstStyle/>
-          <a:p>
-            <a:endParaRPr lang="en-CH" dirty="0"/>
-          </a:p>
-        </p:txBody>
-      </p:sp>
-      <p:pic>
-        <p:nvPicPr>
-          <p:cNvPr id="4" name="Picture 3">
-            <a:extLst>
-              <a:ext uri="{FF2B5EF4-FFF2-40B4-BE49-F238E27FC236}">
-                <a16:creationId xmlns:a16="http://schemas.microsoft.com/office/drawing/2014/main" id="{E239DDEA-128F-4E25-8752-1BC0A7B1EA31}"/>
-              </a:ext>
-            </a:extLst>
-          </p:cNvPr>
-          <p:cNvPicPr>
-            <a:picLocks noChangeAspect="1"/>
-          </p:cNvPicPr>
-          <p:nvPr/>
         </p:nvPicPr>
         <p:blipFill>
-          <a:blip r:embed="rId2"/>
+          <a:blip r:embed="rId2">
+            <a:extLst>
+              <a:ext uri="{28A0092B-C50C-407E-A947-70E740481C1C}">
+                <a14:useLocalDpi xmlns:a14="http://schemas.microsoft.com/office/drawing/2010/main" val="0"/>
+              </a:ext>
+            </a:extLst>
+          </a:blip>
           <a:stretch>
             <a:fillRect/>
           </a:stretch>
         </p:blipFill>
         <p:spPr>
           <a:xfrm>
-            <a:off x="1018864" y="1424450"/>
-            <a:ext cx="9004201" cy="5263868"/>
-          </a:xfrm>
-          <a:prstGeom prst="rect">
-            <a:avLst/>
-          </a:prstGeom>
+            <a:off x="1124799" y="988996"/>
+            <a:ext cx="9942401" cy="5351974"/>
+          </a:xfrm>
         </p:spPr>
       </p:pic>
     </p:spTree>
     <p:extLst>
       <p:ext uri="{BB962C8B-B14F-4D97-AF65-F5344CB8AC3E}">
-        <p14:creationId xmlns:p14="http://schemas.microsoft.com/office/powerpoint/2010/main" val="23131327"/>
+        <p14:creationId xmlns:p14="http://schemas.microsoft.com/office/powerpoint/2010/main" val="576138591"/>
       </p:ext>
     </p:extLst>
   </p:cSld>
@@ -3583,7 +3557,7 @@
           <p:cNvPr id="2" name="Title 1">
             <a:extLst>
               <a:ext uri="{FF2B5EF4-FFF2-40B4-BE49-F238E27FC236}">
-                <a16:creationId xmlns:a16="http://schemas.microsoft.com/office/drawing/2014/main" id="{7538AD3F-977C-4D6A-9CB5-A593B38EB679}"/>
+                <a16:creationId xmlns:a16="http://schemas.microsoft.com/office/drawing/2014/main" id="{A21E7202-3D7D-407C-8EE0-91BF00CB80A1}"/>
               </a:ext>
             </a:extLst>
           </p:cNvPr>
@@ -3601,7 +3575,7 @@
           <a:p>
             <a:r>
               <a:rPr lang="de-CH" dirty="0"/>
-              <a:t>Challenges</a:t>
+              <a:t>Evaluation</a:t>
             </a:r>
             <a:endParaRPr lang="en-CH" dirty="0"/>
           </a:p>
@@ -3612,7 +3586,7 @@
           <p:cNvPr id="3" name="Content Placeholder 2">
             <a:extLst>
               <a:ext uri="{FF2B5EF4-FFF2-40B4-BE49-F238E27FC236}">
-                <a16:creationId xmlns:a16="http://schemas.microsoft.com/office/drawing/2014/main" id="{C979DD4D-BBC9-446A-B602-6FB6CE116714}"/>
+                <a16:creationId xmlns:a16="http://schemas.microsoft.com/office/drawing/2014/main" id="{272C2361-FD38-4046-8377-3FE1D473EB1F}"/>
               </a:ext>
             </a:extLst>
           </p:cNvPr>
@@ -3623,6 +3597,127 @@
             <p:ph idx="1"/>
           </p:nvPr>
         </p:nvSpPr>
+        <p:spPr>
+          <a:xfrm>
+            <a:off x="9803876" y="5844619"/>
+            <a:ext cx="1549924" cy="332344"/>
+          </a:xfrm>
+        </p:spPr>
+        <p:txBody>
+          <a:bodyPr>
+            <a:normAutofit fontScale="70000" lnSpcReduction="20000"/>
+          </a:bodyPr>
+          <a:lstStyle/>
+          <a:p>
+            <a:endParaRPr lang="en-CH" dirty="0"/>
+          </a:p>
+        </p:txBody>
+      </p:sp>
+      <p:pic>
+        <p:nvPicPr>
+          <p:cNvPr id="4" name="Picture 3">
+            <a:extLst>
+              <a:ext uri="{FF2B5EF4-FFF2-40B4-BE49-F238E27FC236}">
+                <a16:creationId xmlns:a16="http://schemas.microsoft.com/office/drawing/2014/main" id="{E239DDEA-128F-4E25-8752-1BC0A7B1EA31}"/>
+              </a:ext>
+            </a:extLst>
+          </p:cNvPr>
+          <p:cNvPicPr>
+            <a:picLocks noChangeAspect="1"/>
+          </p:cNvPicPr>
+          <p:nvPr/>
+        </p:nvPicPr>
+        <p:blipFill>
+          <a:blip r:embed="rId2"/>
+          <a:stretch>
+            <a:fillRect/>
+          </a:stretch>
+        </p:blipFill>
+        <p:spPr>
+          <a:xfrm>
+            <a:off x="1018864" y="1424450"/>
+            <a:ext cx="9004201" cy="5263868"/>
+          </a:xfrm>
+          <a:prstGeom prst="rect">
+            <a:avLst/>
+          </a:prstGeom>
+        </p:spPr>
+      </p:pic>
+    </p:spTree>
+    <p:extLst>
+      <p:ext uri="{BB962C8B-B14F-4D97-AF65-F5344CB8AC3E}">
+        <p14:creationId xmlns:p14="http://schemas.microsoft.com/office/powerpoint/2010/main" val="23131327"/>
+      </p:ext>
+    </p:extLst>
+  </p:cSld>
+  <p:clrMapOvr>
+    <a:masterClrMapping/>
+  </p:clrMapOvr>
+</p:sld>
+</file>
+
+<file path=ppt/slides/slide12.xml><?xml version="1.0" encoding="utf-8"?>
+<p:sld xmlns:a="http://schemas.openxmlformats.org/drawingml/2006/main" xmlns:r="http://schemas.openxmlformats.org/officeDocument/2006/relationships" xmlns:p="http://schemas.openxmlformats.org/presentationml/2006/main">
+  <p:cSld>
+    <p:spTree>
+      <p:nvGrpSpPr>
+        <p:cNvPr id="1" name=""/>
+        <p:cNvGrpSpPr/>
+        <p:nvPr/>
+      </p:nvGrpSpPr>
+      <p:grpSpPr>
+        <a:xfrm>
+          <a:off x="0" y="0"/>
+          <a:ext cx="0" cy="0"/>
+          <a:chOff x="0" y="0"/>
+          <a:chExt cx="0" cy="0"/>
+        </a:xfrm>
+      </p:grpSpPr>
+      <p:sp>
+        <p:nvSpPr>
+          <p:cNvPr id="2" name="Title 1">
+            <a:extLst>
+              <a:ext uri="{FF2B5EF4-FFF2-40B4-BE49-F238E27FC236}">
+                <a16:creationId xmlns:a16="http://schemas.microsoft.com/office/drawing/2014/main" id="{7538AD3F-977C-4D6A-9CB5-A593B38EB679}"/>
+              </a:ext>
+            </a:extLst>
+          </p:cNvPr>
+          <p:cNvSpPr>
+            <a:spLocks noGrp="1"/>
+          </p:cNvSpPr>
+          <p:nvPr>
+            <p:ph type="title"/>
+          </p:nvPr>
+        </p:nvSpPr>
+        <p:spPr/>
+        <p:txBody>
+          <a:bodyPr/>
+          <a:lstStyle/>
+          <a:p>
+            <a:r>
+              <a:rPr lang="de-CH" dirty="0"/>
+              <a:t>Challenges</a:t>
+            </a:r>
+            <a:endParaRPr lang="en-CH" dirty="0"/>
+          </a:p>
+        </p:txBody>
+      </p:sp>
+      <p:sp>
+        <p:nvSpPr>
+          <p:cNvPr id="3" name="Content Placeholder 2">
+            <a:extLst>
+              <a:ext uri="{FF2B5EF4-FFF2-40B4-BE49-F238E27FC236}">
+                <a16:creationId xmlns:a16="http://schemas.microsoft.com/office/drawing/2014/main" id="{C979DD4D-BBC9-446A-B602-6FB6CE116714}"/>
+              </a:ext>
+            </a:extLst>
+          </p:cNvPr>
+          <p:cNvSpPr>
+            <a:spLocks noGrp="1"/>
+          </p:cNvSpPr>
+          <p:nvPr>
+            <p:ph idx="1"/>
+          </p:nvPr>
+        </p:nvSpPr>
         <p:spPr/>
         <p:txBody>
           <a:bodyPr>
@@ -3651,7 +3746,7 @@
           <a:p>
             <a:r>
               <a:rPr lang="de-CH" sz="2400" dirty="0"/>
-              <a:t>pcap too long</a:t>
+              <a:t>pcap files are very big</a:t>
             </a:r>
           </a:p>
           <a:p>
@@ -3669,22 +3764,14 @@
           <a:p>
             <a:r>
               <a:rPr lang="de-CH" sz="2400" dirty="0"/>
-              <a:t>Communication between </a:t>
-            </a:r>
-            <a:r>
-              <a:rPr lang="de-CH" sz="2400"/>
-              <a:t>l2controller </a:t>
+              <a:t>Communication between l2controller </a:t>
             </a:r>
             <a:br>
-              <a:rPr lang="de-CH" sz="2400"/>
+              <a:rPr lang="de-CH" sz="2400" dirty="0"/>
             </a:br>
             <a:r>
-              <a:rPr lang="de-CH" sz="2400"/>
-              <a:t>and </a:t>
-            </a:r>
-            <a:r>
               <a:rPr lang="de-CH" sz="2400" dirty="0"/>
-              <a:t>coordinator is asynchronous</a:t>
+              <a:t>and coordinator is asynchronous</a:t>
             </a:r>
           </a:p>
         </p:txBody>
@@ -3702,7 +3789,7 @@
 </p:sld>
 </file>
 
-<file path=ppt/slides/slide12.xml><?xml version="1.0" encoding="utf-8"?>
+<file path=ppt/slides/slide13.xml><?xml version="1.0" encoding="utf-8"?>
 <p:sld xmlns:a="http://schemas.openxmlformats.org/drawingml/2006/main" xmlns:r="http://schemas.openxmlformats.org/officeDocument/2006/relationships" xmlns:p="http://schemas.openxmlformats.org/presentationml/2006/main">
   <p:cSld>
     <p:spTree>
@@ -7059,10 +7146,7 @@
             <a:avLst/>
           </a:prstGeom>
           <a:solidFill>
-            <a:schemeClr val="tx1">
-              <a:lumMod val="50000"/>
-              <a:lumOff val="50000"/>
-            </a:schemeClr>
+            <a:srgbClr val="FFFF00"/>
           </a:solidFill>
           <a:ln>
             <a:solidFill>
@@ -7713,10 +7797,7 @@
             <a:avLst/>
           </a:prstGeom>
           <a:solidFill>
-            <a:schemeClr val="tx1">
-              <a:lumMod val="50000"/>
-              <a:lumOff val="50000"/>
-            </a:schemeClr>
+            <a:srgbClr val="FFFF00"/>
           </a:solidFill>
           <a:ln>
             <a:solidFill>
@@ -9235,6 +9316,78 @@
                                           </p:stCondLst>
                                         </p:cTn>
                                         <p:tgtEl>
+                                          <p:spTgt spid="35"/>
+                                        </p:tgtEl>
+                                        <p:attrNameLst>
+                                          <p:attrName>style.visibility</p:attrName>
+                                        </p:attrNameLst>
+                                      </p:cBhvr>
+                                      <p:to>
+                                        <p:strVal val="visible"/>
+                                      </p:to>
+                                    </p:set>
+                                  </p:childTnLst>
+                                </p:cTn>
+                              </p:par>
+                              <p:par>
+                                <p:cTn id="15" presetID="1" presetClass="entr" presetSubtype="0" fill="hold" grpId="0" nodeType="withEffect">
+                                  <p:stCondLst>
+                                    <p:cond delay="0"/>
+                                  </p:stCondLst>
+                                  <p:childTnLst>
+                                    <p:set>
+                                      <p:cBhvr>
+                                        <p:cTn id="16" dur="1" fill="hold">
+                                          <p:stCondLst>
+                                            <p:cond delay="0"/>
+                                          </p:stCondLst>
+                                        </p:cTn>
+                                        <p:tgtEl>
+                                          <p:spTgt spid="36"/>
+                                        </p:tgtEl>
+                                        <p:attrNameLst>
+                                          <p:attrName>style.visibility</p:attrName>
+                                        </p:attrNameLst>
+                                      </p:cBhvr>
+                                      <p:to>
+                                        <p:strVal val="visible"/>
+                                      </p:to>
+                                    </p:set>
+                                  </p:childTnLst>
+                                </p:cTn>
+                              </p:par>
+                            </p:childTnLst>
+                          </p:cTn>
+                        </p:par>
+                      </p:childTnLst>
+                    </p:cTn>
+                  </p:par>
+                  <p:par>
+                    <p:cTn id="17" fill="hold">
+                      <p:stCondLst>
+                        <p:cond delay="indefinite"/>
+                      </p:stCondLst>
+                      <p:childTnLst>
+                        <p:par>
+                          <p:cTn id="18" fill="hold">
+                            <p:stCondLst>
+                              <p:cond delay="0"/>
+                            </p:stCondLst>
+                            <p:childTnLst>
+                              <p:par>
+                                <p:cTn id="19" presetID="1" presetClass="entr" presetSubtype="0" fill="hold" nodeType="clickEffect">
+                                  <p:stCondLst>
+                                    <p:cond delay="0"/>
+                                  </p:stCondLst>
+                                  <p:childTnLst>
+                                    <p:set>
+                                      <p:cBhvr>
+                                        <p:cTn id="20" dur="1" fill="hold">
+                                          <p:stCondLst>
+                                            <p:cond delay="0"/>
+                                          </p:stCondLst>
+                                        </p:cTn>
+                                        <p:tgtEl>
                                           <p:spTgt spid="28"/>
                                         </p:tgtEl>
                                         <p:attrNameLst>
@@ -9249,14 +9402,14 @@
                                 </p:cTn>
                               </p:par>
                               <p:par>
-                                <p:cTn id="15" presetID="1" presetClass="entr" presetSubtype="0" fill="hold" nodeType="withEffect">
+                                <p:cTn id="21" presetID="1" presetClass="entr" presetSubtype="0" fill="hold" nodeType="withEffect">
                                   <p:stCondLst>
                                     <p:cond delay="0"/>
                                   </p:stCondLst>
                                   <p:childTnLst>
                                     <p:set>
                                       <p:cBhvr>
-                                        <p:cTn id="16" dur="1" fill="hold">
+                                        <p:cTn id="22" dur="1" fill="hold">
                                           <p:stCondLst>
                                             <p:cond delay="0"/>
                                           </p:stCondLst>
@@ -9276,20 +9429,20 @@
                                 </p:cTn>
                               </p:par>
                               <p:par>
-                                <p:cTn id="17" presetID="1" presetClass="entr" presetSubtype="0" fill="hold" nodeType="withEffect">
+                                <p:cTn id="23" presetID="1" presetClass="entr" presetSubtype="0" fill="hold" grpId="0" nodeType="withEffect">
                                   <p:stCondLst>
                                     <p:cond delay="0"/>
                                   </p:stCondLst>
                                   <p:childTnLst>
                                     <p:set>
                                       <p:cBhvr>
-                                        <p:cTn id="18" dur="1" fill="hold">
+                                        <p:cTn id="24" dur="1" fill="hold">
                                           <p:stCondLst>
                                             <p:cond delay="0"/>
                                           </p:stCondLst>
                                         </p:cTn>
                                         <p:tgtEl>
-                                          <p:spTgt spid="35"/>
+                                          <p:spTgt spid="39"/>
                                         </p:tgtEl>
                                         <p:attrNameLst>
                                           <p:attrName>style.visibility</p:attrName>
@@ -9303,20 +9456,20 @@
                                 </p:cTn>
                               </p:par>
                               <p:par>
-                                <p:cTn id="19" presetID="1" presetClass="entr" presetSubtype="0" fill="hold" grpId="0" nodeType="withEffect">
+                                <p:cTn id="25" presetID="1" presetClass="entr" presetSubtype="0" fill="hold" grpId="0" nodeType="withEffect">
                                   <p:stCondLst>
                                     <p:cond delay="0"/>
                                   </p:stCondLst>
                                   <p:childTnLst>
                                     <p:set>
                                       <p:cBhvr>
-                                        <p:cTn id="20" dur="1" fill="hold">
+                                        <p:cTn id="26" dur="1" fill="hold">
                                           <p:stCondLst>
                                             <p:cond delay="0"/>
                                           </p:stCondLst>
                                         </p:cTn>
                                         <p:tgtEl>
-                                          <p:spTgt spid="36"/>
+                                          <p:spTgt spid="40"/>
                                         </p:tgtEl>
                                         <p:attrNameLst>
                                           <p:attrName>style.visibility</p:attrName>
@@ -9360,6 +9513,8 @@
       <p:bldP spid="8" grpId="0" animBg="1"/>
       <p:bldP spid="27" grpId="0" animBg="1"/>
       <p:bldP spid="36" grpId="0"/>
+      <p:bldP spid="39" grpId="0"/>
+      <p:bldP spid="40" grpId="0"/>
     </p:bldLst>
   </p:timing>
 </p:sld>

</xml_diff>